<commit_message>
modified the date in GPA1-B
</commit_message>
<xml_diff>
--- a/SipesSimeon_GPA1-B.pptx
+++ b/SipesSimeon_GPA1-B.pptx
@@ -107,6 +107,11 @@
       </a:defRPr>
     </a:lvl9pPr>
   </p:defaultTextStyle>
+  <p:extLst>
+    <p:ext uri="{EFAFB233-063F-42B5-8137-9DF3F51BA10A}">
+      <p15:sldGuideLst xmlns:p15="http://schemas.microsoft.com/office/powerpoint/2012/main"/>
+    </p:ext>
+  </p:extLst>
 </p:presentation>
 </file>
 
@@ -257,7 +262,7 @@
           <a:p>
             <a:fld id="{25BB5CA3-C62B-460F-8C0A-2443501A19EA}" type="datetimeFigureOut">
               <a:rPr lang="en-US" smtClean="0"/>
-              <a:t>9/1/2025</a:t>
+              <a:t>11/9/2025</a:t>
             </a:fld>
             <a:endParaRPr lang="en-US"/>
           </a:p>
@@ -455,7 +460,7 @@
           <a:p>
             <a:fld id="{25BB5CA3-C62B-460F-8C0A-2443501A19EA}" type="datetimeFigureOut">
               <a:rPr lang="en-US" smtClean="0"/>
-              <a:t>9/1/2025</a:t>
+              <a:t>11/9/2025</a:t>
             </a:fld>
             <a:endParaRPr lang="en-US"/>
           </a:p>
@@ -663,7 +668,7 @@
           <a:p>
             <a:fld id="{25BB5CA3-C62B-460F-8C0A-2443501A19EA}" type="datetimeFigureOut">
               <a:rPr lang="en-US" smtClean="0"/>
-              <a:t>9/1/2025</a:t>
+              <a:t>11/9/2025</a:t>
             </a:fld>
             <a:endParaRPr lang="en-US"/>
           </a:p>
@@ -861,7 +866,7 @@
           <a:p>
             <a:fld id="{25BB5CA3-C62B-460F-8C0A-2443501A19EA}" type="datetimeFigureOut">
               <a:rPr lang="en-US" smtClean="0"/>
-              <a:t>9/1/2025</a:t>
+              <a:t>11/9/2025</a:t>
             </a:fld>
             <a:endParaRPr lang="en-US"/>
           </a:p>
@@ -1136,7 +1141,7 @@
           <a:p>
             <a:fld id="{25BB5CA3-C62B-460F-8C0A-2443501A19EA}" type="datetimeFigureOut">
               <a:rPr lang="en-US" smtClean="0"/>
-              <a:t>9/1/2025</a:t>
+              <a:t>11/9/2025</a:t>
             </a:fld>
             <a:endParaRPr lang="en-US"/>
           </a:p>
@@ -1401,7 +1406,7 @@
           <a:p>
             <a:fld id="{25BB5CA3-C62B-460F-8C0A-2443501A19EA}" type="datetimeFigureOut">
               <a:rPr lang="en-US" smtClean="0"/>
-              <a:t>9/1/2025</a:t>
+              <a:t>11/9/2025</a:t>
             </a:fld>
             <a:endParaRPr lang="en-US"/>
           </a:p>
@@ -1813,7 +1818,7 @@
           <a:p>
             <a:fld id="{25BB5CA3-C62B-460F-8C0A-2443501A19EA}" type="datetimeFigureOut">
               <a:rPr lang="en-US" smtClean="0"/>
-              <a:t>9/1/2025</a:t>
+              <a:t>11/9/2025</a:t>
             </a:fld>
             <a:endParaRPr lang="en-US"/>
           </a:p>
@@ -1954,7 +1959,7 @@
           <a:p>
             <a:fld id="{25BB5CA3-C62B-460F-8C0A-2443501A19EA}" type="datetimeFigureOut">
               <a:rPr lang="en-US" smtClean="0"/>
-              <a:t>9/1/2025</a:t>
+              <a:t>11/9/2025</a:t>
             </a:fld>
             <a:endParaRPr lang="en-US"/>
           </a:p>
@@ -2067,7 +2072,7 @@
           <a:p>
             <a:fld id="{25BB5CA3-C62B-460F-8C0A-2443501A19EA}" type="datetimeFigureOut">
               <a:rPr lang="en-US" smtClean="0"/>
-              <a:t>9/1/2025</a:t>
+              <a:t>11/9/2025</a:t>
             </a:fld>
             <a:endParaRPr lang="en-US"/>
           </a:p>
@@ -2378,7 +2383,7 @@
           <a:p>
             <a:fld id="{25BB5CA3-C62B-460F-8C0A-2443501A19EA}" type="datetimeFigureOut">
               <a:rPr lang="en-US" smtClean="0"/>
-              <a:t>9/1/2025</a:t>
+              <a:t>11/9/2025</a:t>
             </a:fld>
             <a:endParaRPr lang="en-US"/>
           </a:p>
@@ -2666,7 +2671,7 @@
           <a:p>
             <a:fld id="{25BB5CA3-C62B-460F-8C0A-2443501A19EA}" type="datetimeFigureOut">
               <a:rPr lang="en-US" smtClean="0"/>
-              <a:t>9/1/2025</a:t>
+              <a:t>11/9/2025</a:t>
             </a:fld>
             <a:endParaRPr lang="en-US"/>
           </a:p>
@@ -2907,7 +2912,7 @@
           <a:p>
             <a:fld id="{25BB5CA3-C62B-460F-8C0A-2443501A19EA}" type="datetimeFigureOut">
               <a:rPr lang="en-US" smtClean="0"/>
-              <a:t>9/1/2025</a:t>
+              <a:t>11/9/2025</a:t>
             </a:fld>
             <a:endParaRPr lang="en-US"/>
           </a:p>
@@ -3381,7 +3386,7 @@
           <a:p>
             <a:r>
               <a:rPr lang="en-US" dirty="0"/>
-              <a:t>08/31/25</a:t>
+              <a:t>11/04/25</a:t>
             </a:r>
           </a:p>
         </p:txBody>

</xml_diff>